<commit_message>
Updated the LPSmap with more TCA and amino acid connections
</commit_message>
<xml_diff>
--- a/LPSmap10-14-23.pptx
+++ b/LPSmap10-14-23.pptx
@@ -6824,14 +6824,14 @@
           <p:cNvCxnSpPr>
             <a:cxnSpLocks/>
             <a:stCxn id="13" idx="1"/>
-            <a:endCxn id="82" idx="3"/>
+            <a:endCxn id="81" idx="3"/>
           </p:cNvCxnSpPr>
           <p:nvPr/>
         </p:nvCxnSpPr>
         <p:spPr>
-          <a:xfrm flipH="1">
-            <a:off x="2790632" y="3190721"/>
-            <a:ext cx="762447" cy="193918"/>
+          <a:xfrm flipH="1" flipV="1">
+            <a:off x="2756167" y="3065050"/>
+            <a:ext cx="796912" cy="125671"/>
           </a:xfrm>
           <a:prstGeom prst="line">
             <a:avLst/>
@@ -7003,7 +7003,7 @@
         </p:nvSpPr>
         <p:spPr>
           <a:xfrm>
-            <a:off x="1568350" y="1450268"/>
+            <a:off x="2811853" y="4899808"/>
             <a:ext cx="508474" cy="169277"/>
           </a:xfrm>
           <a:prstGeom prst="rect">
@@ -7046,7 +7046,7 @@
         </p:nvSpPr>
         <p:spPr>
           <a:xfrm>
-            <a:off x="2232466" y="1450268"/>
+            <a:off x="2871995" y="5151697"/>
             <a:ext cx="611065" cy="169277"/>
           </a:xfrm>
           <a:prstGeom prst="rect">
@@ -7086,15 +7086,15 @@
           </p:cNvPr>
           <p:cNvCxnSpPr>
             <a:cxnSpLocks/>
-            <a:stCxn id="102" idx="3"/>
-            <a:endCxn id="103" idx="1"/>
+            <a:stCxn id="102" idx="2"/>
+            <a:endCxn id="103" idx="0"/>
           </p:cNvCxnSpPr>
           <p:nvPr/>
         </p:nvCxnSpPr>
         <p:spPr>
           <a:xfrm>
-            <a:off x="2076824" y="1534907"/>
-            <a:ext cx="155642" cy="0"/>
+            <a:off x="3066090" y="5069085"/>
+            <a:ext cx="111438" cy="82612"/>
           </a:xfrm>
           <a:prstGeom prst="line">
             <a:avLst/>
@@ -16850,7 +16850,7 @@
         </p:nvSpPr>
         <p:spPr>
           <a:xfrm>
-            <a:off x="2860503" y="3424520"/>
+            <a:off x="2987048" y="3348482"/>
             <a:ext cx="482825" cy="169277"/>
           </a:xfrm>
           <a:prstGeom prst="rect">
@@ -16859,7 +16859,7 @@
           <a:noFill/>
         </p:spPr>
         <p:txBody>
-          <a:bodyPr wrap="none" rtlCol="0">
+          <a:bodyPr wrap="square" rtlCol="0">
             <a:spAutoFit/>
           </a:bodyPr>
           <a:lstStyle/>
@@ -17113,9 +17113,314 @@
           <p:nvPr/>
         </p:nvCxnSpPr>
         <p:spPr>
+          <a:xfrm flipH="1" flipV="1">
+            <a:off x="3469873" y="3433121"/>
+            <a:ext cx="46337" cy="3011"/>
+          </a:xfrm>
+          <a:prstGeom prst="line">
+            <a:avLst/>
+          </a:prstGeom>
+          <a:ln>
+            <a:solidFill>
+              <a:schemeClr val="tx1"/>
+            </a:solidFill>
+          </a:ln>
+        </p:spPr>
+        <p:style>
+          <a:lnRef idx="1">
+            <a:schemeClr val="accent1"/>
+          </a:lnRef>
+          <a:fillRef idx="0">
+            <a:schemeClr val="accent1"/>
+          </a:fillRef>
+          <a:effectRef idx="0">
+            <a:schemeClr val="accent1"/>
+          </a:effectRef>
+          <a:fontRef idx="minor">
+            <a:schemeClr val="tx1"/>
+          </a:fontRef>
+        </p:style>
+      </p:cxnSp>
+      <p:cxnSp>
+        <p:nvCxnSpPr>
+          <p:cNvPr id="3" name="Straight Connector 2">
+            <a:extLst>
+              <a:ext uri="{FF2B5EF4-FFF2-40B4-BE49-F238E27FC236}">
+                <a16:creationId xmlns:a16="http://schemas.microsoft.com/office/drawing/2014/main" id="{2C2C7265-9B0B-6A70-8EE4-C1881CE674E6}"/>
+              </a:ext>
+            </a:extLst>
+          </p:cNvPr>
+          <p:cNvCxnSpPr>
+            <a:cxnSpLocks/>
+            <a:stCxn id="68" idx="3"/>
+            <a:endCxn id="147" idx="3"/>
+          </p:cNvCxnSpPr>
+          <p:nvPr/>
+        </p:nvCxnSpPr>
+        <p:spPr>
           <a:xfrm flipH="1">
-            <a:off x="3343328" y="3436132"/>
-            <a:ext cx="172882" cy="73027"/>
+            <a:off x="7888240" y="4976273"/>
+            <a:ext cx="538246" cy="83672"/>
+          </a:xfrm>
+          <a:prstGeom prst="line">
+            <a:avLst/>
+          </a:prstGeom>
+          <a:ln>
+            <a:solidFill>
+              <a:schemeClr val="tx1"/>
+            </a:solidFill>
+          </a:ln>
+        </p:spPr>
+        <p:style>
+          <a:lnRef idx="1">
+            <a:schemeClr val="accent1"/>
+          </a:lnRef>
+          <a:fillRef idx="0">
+            <a:schemeClr val="accent1"/>
+          </a:fillRef>
+          <a:effectRef idx="0">
+            <a:schemeClr val="accent1"/>
+          </a:effectRef>
+          <a:fontRef idx="minor">
+            <a:schemeClr val="tx1"/>
+          </a:fontRef>
+        </p:style>
+      </p:cxnSp>
+      <p:sp>
+        <p:nvSpPr>
+          <p:cNvPr id="68" name="TextBox 67">
+            <a:extLst>
+              <a:ext uri="{FF2B5EF4-FFF2-40B4-BE49-F238E27FC236}">
+                <a16:creationId xmlns:a16="http://schemas.microsoft.com/office/drawing/2014/main" id="{2D050A98-FEF9-BE41-5F4B-DF22343AA53F}"/>
+              </a:ext>
+            </a:extLst>
+          </p:cNvPr>
+          <p:cNvSpPr txBox="1"/>
+          <p:nvPr/>
+        </p:nvSpPr>
+        <p:spPr>
+          <a:xfrm flipH="1">
+            <a:off x="8426486" y="4891634"/>
+            <a:ext cx="442749" cy="169277"/>
+          </a:xfrm>
+          <a:prstGeom prst="rect">
+            <a:avLst/>
+          </a:prstGeom>
+          <a:noFill/>
+        </p:spPr>
+        <p:txBody>
+          <a:bodyPr wrap="square" rtlCol="0">
+            <a:spAutoFit/>
+          </a:bodyPr>
+          <a:lstStyle/>
+          <a:p>
+            <a:pPr algn="ctr"/>
+            <a:r>
+              <a:rPr lang="en-US" sz="500" b="1" dirty="0">
+                <a:latin typeface="Arial" panose="020B0604020202020204" pitchFamily="34" charset="0"/>
+                <a:cs typeface="Arial" panose="020B0604020202020204" pitchFamily="34" charset="0"/>
+              </a:rPr>
+              <a:t>Arginine</a:t>
+            </a:r>
+            <a:endParaRPr lang="en-US" sz="500" b="1" baseline="-25000" dirty="0">
+              <a:latin typeface="Arial" panose="020B0604020202020204" pitchFamily="34" charset="0"/>
+              <a:cs typeface="Arial" panose="020B0604020202020204" pitchFamily="34" charset="0"/>
+            </a:endParaRPr>
+          </a:p>
+        </p:txBody>
+      </p:sp>
+      <p:cxnSp>
+        <p:nvCxnSpPr>
+          <p:cNvPr id="71" name="Straight Connector 70">
+            <a:extLst>
+              <a:ext uri="{FF2B5EF4-FFF2-40B4-BE49-F238E27FC236}">
+                <a16:creationId xmlns:a16="http://schemas.microsoft.com/office/drawing/2014/main" id="{514DE89A-C81D-601E-9630-D131AF2CBACC}"/>
+              </a:ext>
+            </a:extLst>
+          </p:cNvPr>
+          <p:cNvCxnSpPr>
+            <a:cxnSpLocks/>
+            <a:stCxn id="91" idx="3"/>
+            <a:endCxn id="147" idx="3"/>
+          </p:cNvCxnSpPr>
+          <p:nvPr/>
+        </p:nvCxnSpPr>
+        <p:spPr>
+          <a:xfrm flipH="1" flipV="1">
+            <a:off x="7888240" y="5059945"/>
+            <a:ext cx="562134" cy="129270"/>
+          </a:xfrm>
+          <a:prstGeom prst="line">
+            <a:avLst/>
+          </a:prstGeom>
+          <a:ln>
+            <a:solidFill>
+              <a:schemeClr val="tx1"/>
+            </a:solidFill>
+          </a:ln>
+        </p:spPr>
+        <p:style>
+          <a:lnRef idx="1">
+            <a:schemeClr val="accent1"/>
+          </a:lnRef>
+          <a:fillRef idx="0">
+            <a:schemeClr val="accent1"/>
+          </a:fillRef>
+          <a:effectRef idx="0">
+            <a:schemeClr val="accent1"/>
+          </a:effectRef>
+          <a:fontRef idx="minor">
+            <a:schemeClr val="tx1"/>
+          </a:fontRef>
+        </p:style>
+      </p:cxnSp>
+      <p:sp>
+        <p:nvSpPr>
+          <p:cNvPr id="91" name="TextBox 90">
+            <a:extLst>
+              <a:ext uri="{FF2B5EF4-FFF2-40B4-BE49-F238E27FC236}">
+                <a16:creationId xmlns:a16="http://schemas.microsoft.com/office/drawing/2014/main" id="{9C284D8E-3A5C-CA69-AB24-4CBFBF755AD8}"/>
+              </a:ext>
+            </a:extLst>
+          </p:cNvPr>
+          <p:cNvSpPr txBox="1"/>
+          <p:nvPr/>
+        </p:nvSpPr>
+        <p:spPr>
+          <a:xfrm flipH="1">
+            <a:off x="8450374" y="5104576"/>
+            <a:ext cx="554960" cy="169277"/>
+          </a:xfrm>
+          <a:prstGeom prst="rect">
+            <a:avLst/>
+          </a:prstGeom>
+          <a:noFill/>
+        </p:spPr>
+        <p:txBody>
+          <a:bodyPr wrap="none" rtlCol="0">
+            <a:spAutoFit/>
+          </a:bodyPr>
+          <a:lstStyle/>
+          <a:p>
+            <a:pPr algn="ctr"/>
+            <a:r>
+              <a:rPr lang="en-US" sz="500" b="1" dirty="0">
+                <a:latin typeface="Arial" panose="020B0604020202020204" pitchFamily="34" charset="0"/>
+                <a:cs typeface="Arial" panose="020B0604020202020204" pitchFamily="34" charset="0"/>
+              </a:rPr>
+              <a:t>L-Glutamine</a:t>
+            </a:r>
+            <a:endParaRPr lang="en-US" sz="500" b="1" baseline="-25000" dirty="0">
+              <a:latin typeface="Arial" panose="020B0604020202020204" pitchFamily="34" charset="0"/>
+              <a:cs typeface="Arial" panose="020B0604020202020204" pitchFamily="34" charset="0"/>
+            </a:endParaRPr>
+          </a:p>
+        </p:txBody>
+      </p:sp>
+      <p:sp>
+        <p:nvSpPr>
+          <p:cNvPr id="93" name="TextBox 92">
+            <a:extLst>
+              <a:ext uri="{FF2B5EF4-FFF2-40B4-BE49-F238E27FC236}">
+                <a16:creationId xmlns:a16="http://schemas.microsoft.com/office/drawing/2014/main" id="{013D6909-27AC-AE2D-AA8E-DA978233672F}"/>
+              </a:ext>
+            </a:extLst>
+          </p:cNvPr>
+          <p:cNvSpPr txBox="1"/>
+          <p:nvPr/>
+        </p:nvSpPr>
+        <p:spPr>
+          <a:xfrm>
+            <a:off x="2829832" y="3517185"/>
+            <a:ext cx="553358" cy="169277"/>
+          </a:xfrm>
+          <a:prstGeom prst="rect">
+            <a:avLst/>
+          </a:prstGeom>
+          <a:noFill/>
+        </p:spPr>
+        <p:txBody>
+          <a:bodyPr wrap="none" rtlCol="0">
+            <a:spAutoFit/>
+          </a:bodyPr>
+          <a:lstStyle/>
+          <a:p>
+            <a:pPr algn="ctr"/>
+            <a:r>
+              <a:rPr lang="en-US" sz="500" b="1" dirty="0">
+                <a:latin typeface="Arial" panose="020B0604020202020204" pitchFamily="34" charset="0"/>
+                <a:cs typeface="Arial" panose="020B0604020202020204" pitchFamily="34" charset="0"/>
+              </a:rPr>
+              <a:t>L-Isoleucine</a:t>
+            </a:r>
+          </a:p>
+        </p:txBody>
+      </p:sp>
+      <p:cxnSp>
+        <p:nvCxnSpPr>
+          <p:cNvPr id="137" name="Straight Connector 136">
+            <a:extLst>
+              <a:ext uri="{FF2B5EF4-FFF2-40B4-BE49-F238E27FC236}">
+                <a16:creationId xmlns:a16="http://schemas.microsoft.com/office/drawing/2014/main" id="{745B00F5-A0B1-DF3F-F5F6-8F086F1F24ED}"/>
+              </a:ext>
+            </a:extLst>
+          </p:cNvPr>
+          <p:cNvCxnSpPr>
+            <a:cxnSpLocks/>
+            <a:stCxn id="34" idx="1"/>
+            <a:endCxn id="93" idx="3"/>
+          </p:cNvCxnSpPr>
+          <p:nvPr/>
+        </p:nvCxnSpPr>
+        <p:spPr>
+          <a:xfrm flipH="1">
+            <a:off x="3383190" y="3436132"/>
+            <a:ext cx="133020" cy="165692"/>
+          </a:xfrm>
+          <a:prstGeom prst="line">
+            <a:avLst/>
+          </a:prstGeom>
+          <a:ln>
+            <a:solidFill>
+              <a:schemeClr val="tx1"/>
+            </a:solidFill>
+          </a:ln>
+        </p:spPr>
+        <p:style>
+          <a:lnRef idx="1">
+            <a:schemeClr val="accent1"/>
+          </a:lnRef>
+          <a:fillRef idx="0">
+            <a:schemeClr val="accent1"/>
+          </a:fillRef>
+          <a:effectRef idx="0">
+            <a:schemeClr val="accent1"/>
+          </a:effectRef>
+          <a:fontRef idx="minor">
+            <a:schemeClr val="tx1"/>
+          </a:fontRef>
+        </p:style>
+      </p:cxnSp>
+      <p:cxnSp>
+        <p:nvCxnSpPr>
+          <p:cNvPr id="146" name="Straight Connector 145">
+            <a:extLst>
+              <a:ext uri="{FF2B5EF4-FFF2-40B4-BE49-F238E27FC236}">
+                <a16:creationId xmlns:a16="http://schemas.microsoft.com/office/drawing/2014/main" id="{E624FB22-4B99-BE1E-8BC9-2342387FDB4D}"/>
+              </a:ext>
+            </a:extLst>
+          </p:cNvPr>
+          <p:cNvCxnSpPr>
+            <a:cxnSpLocks/>
+            <a:stCxn id="102" idx="0"/>
+            <a:endCxn id="21" idx="2"/>
+          </p:cNvCxnSpPr>
+          <p:nvPr/>
+        </p:nvCxnSpPr>
+        <p:spPr>
+          <a:xfrm flipV="1">
+            <a:off x="3066090" y="4452640"/>
+            <a:ext cx="20341" cy="447168"/>
           </a:xfrm>
           <a:prstGeom prst="line">
             <a:avLst/>

</xml_diff>

<commit_message>
Finalized fixing some map elements.
</commit_message>
<xml_diff>
--- a/LPSmap10-14-23.pptx
+++ b/LPSmap10-14-23.pptx
@@ -3565,7 +3565,7 @@
         <p:spPr>
           <a:xfrm>
             <a:off x="3285378" y="1519856"/>
-            <a:ext cx="989374" cy="220573"/>
+            <a:ext cx="989373" cy="169277"/>
           </a:xfrm>
           <a:prstGeom prst="rect">
             <a:avLst/>
@@ -3586,9 +3586,6 @@
               </a:rPr>
               <a:t>Fructose 1,6-bisphosphate</a:t>
             </a:r>
-          </a:p>
-          <a:p>
-            <a:pPr algn="ctr"/>
             <a:endParaRPr lang="en-US" sz="500" b="1" baseline="-25000" dirty="0">
               <a:latin typeface="Arial" panose="020B0604020202020204" pitchFamily="34" charset="0"/>
               <a:cs typeface="Arial" panose="020B0604020202020204" pitchFamily="34" charset="0"/>
@@ -3779,7 +3776,7 @@
         <p:spPr>
           <a:xfrm>
             <a:off x="3346292" y="2841712"/>
-            <a:ext cx="867545" cy="220573"/>
+            <a:ext cx="867545" cy="169277"/>
           </a:xfrm>
           <a:prstGeom prst="rect">
             <a:avLst/>
@@ -3807,9 +3804,6 @@
               </a:rPr>
               <a:t> pyruvate</a:t>
             </a:r>
-          </a:p>
-          <a:p>
-            <a:pPr algn="ctr"/>
             <a:endParaRPr lang="en-US" sz="500" b="1" baseline="-25000" dirty="0">
               <a:latin typeface="Arial" panose="020B0604020202020204" pitchFamily="34" charset="0"/>
               <a:cs typeface="Arial" panose="020B0604020202020204" pitchFamily="34" charset="0"/>
@@ -4301,7 +4295,7 @@
         <p:spPr>
           <a:xfrm>
             <a:off x="4517535" y="4430382"/>
-            <a:ext cx="779381" cy="220573"/>
+            <a:ext cx="779381" cy="169277"/>
           </a:xfrm>
           <a:prstGeom prst="rect">
             <a:avLst/>
@@ -4316,15 +4310,12 @@
           <a:p>
             <a:pPr algn="ctr"/>
             <a:r>
-              <a:rPr lang="en-US" sz="500" b="1" dirty="0">
+              <a:rPr lang="en-US" sz="500" b="1">
                 <a:latin typeface="Arial" panose="020B0604020202020204" pitchFamily="34" charset="0"/>
                 <a:cs typeface="Arial" panose="020B0604020202020204" pitchFamily="34" charset="0"/>
               </a:rPr>
               <a:t>alpha-Ketoglutarate</a:t>
             </a:r>
-          </a:p>
-          <a:p>
-            <a:pPr algn="ctr"/>
             <a:endParaRPr lang="en-US" sz="500" b="1" baseline="-25000" dirty="0">
               <a:latin typeface="Arial" panose="020B0604020202020204" pitchFamily="34" charset="0"/>
               <a:cs typeface="Arial" panose="020B0604020202020204" pitchFamily="34" charset="0"/>
@@ -4922,8 +4913,8 @@
         </p:nvCxnSpPr>
         <p:spPr>
           <a:xfrm>
-            <a:off x="3780065" y="1740429"/>
-            <a:ext cx="0" cy="43799"/>
+            <a:off x="3780065" y="1689133"/>
+            <a:ext cx="0" cy="95095"/>
           </a:xfrm>
           <a:prstGeom prst="line">
             <a:avLst/>
@@ -5147,8 +5138,8 @@
         </p:nvCxnSpPr>
         <p:spPr>
           <a:xfrm flipH="1">
-            <a:off x="3780064" y="3062285"/>
-            <a:ext cx="1" cy="43797"/>
+            <a:off x="3780064" y="3010989"/>
+            <a:ext cx="1" cy="95093"/>
           </a:xfrm>
           <a:prstGeom prst="line">
             <a:avLst/>
@@ -5417,8 +5408,8 @@
         </p:nvCxnSpPr>
         <p:spPr>
           <a:xfrm flipV="1">
-            <a:off x="4434412" y="4650955"/>
-            <a:ext cx="472814" cy="184081"/>
+            <a:off x="4434412" y="4599659"/>
+            <a:ext cx="472814" cy="235377"/>
           </a:xfrm>
           <a:prstGeom prst="line">
             <a:avLst/>
@@ -5462,8 +5453,8 @@
         </p:nvCxnSpPr>
         <p:spPr>
           <a:xfrm flipH="1" flipV="1">
-            <a:off x="4907226" y="4650955"/>
-            <a:ext cx="166528" cy="149047"/>
+            <a:off x="4907226" y="4599659"/>
+            <a:ext cx="166528" cy="200343"/>
           </a:xfrm>
           <a:prstGeom prst="line">
             <a:avLst/>
@@ -5687,8 +5678,8 @@
         </p:nvCxnSpPr>
         <p:spPr>
           <a:xfrm flipH="1">
-            <a:off x="2928837" y="1630143"/>
-            <a:ext cx="356541" cy="154084"/>
+            <a:off x="2928837" y="1604495"/>
+            <a:ext cx="356541" cy="179732"/>
           </a:xfrm>
           <a:prstGeom prst="line">
             <a:avLst/>
@@ -9366,8 +9357,8 @@
         </p:nvCxnSpPr>
         <p:spPr>
           <a:xfrm>
-            <a:off x="5296916" y="4540669"/>
-            <a:ext cx="2313844" cy="434637"/>
+            <a:off x="5296916" y="4515021"/>
+            <a:ext cx="2313844" cy="460285"/>
           </a:xfrm>
           <a:prstGeom prst="line">
             <a:avLst/>

</xml_diff>